<commit_message>
Correction de la diminution. Test OK
J'ai retirer la verif Min(1) dans adhérent. Sinon ça ne marche pas.
</commit_message>
<xml_diff>
--- a/Documentation/DiapoProg3/PresentationProg3.pptx
+++ b/Documentation/DiapoProg3/PresentationProg3.pptx
@@ -208,7 +208,7 @@
           <a:p>
             <a:fld id="{590AB086-9098-4FF0-889C-4660684A76AF}" type="datetimeFigureOut">
               <a:rPr lang="fr-FR" smtClean="0"/>
-              <a:t>14/02/2014</a:t>
+              <a:t>16/02/2014</a:t>
             </a:fld>
             <a:endParaRPr lang="fr-FR"/>
           </a:p>
@@ -741,7 +741,7 @@
           <a:p>
             <a:fld id="{C902A2D5-3413-48DE-8ECE-1C9F6F60C7B6}" type="datetime1">
               <a:rPr lang="fr-FR" smtClean="0"/>
-              <a:t>14/02/2014</a:t>
+              <a:t>16/02/2014</a:t>
             </a:fld>
             <a:endParaRPr lang="fr-BE"/>
           </a:p>
@@ -910,7 +910,7 @@
           <a:p>
             <a:fld id="{71C392D7-94FE-419D-BC9A-92D04AC65958}" type="datetime1">
               <a:rPr lang="fr-FR" smtClean="0"/>
-              <a:t>14/02/2014</a:t>
+              <a:t>16/02/2014</a:t>
             </a:fld>
             <a:endParaRPr lang="fr-BE"/>
           </a:p>
@@ -1089,7 +1089,7 @@
           <a:p>
             <a:fld id="{BC9C2D57-6320-420E-BC0B-FB96B1240827}" type="datetime1">
               <a:rPr lang="fr-FR" smtClean="0"/>
-              <a:t>14/02/2014</a:t>
+              <a:t>16/02/2014</a:t>
             </a:fld>
             <a:endParaRPr lang="fr-BE"/>
           </a:p>
@@ -1258,7 +1258,7 @@
           <a:p>
             <a:fld id="{A9A568EF-5B02-43D3-99A2-8E755C9E955B}" type="datetime1">
               <a:rPr lang="fr-FR" smtClean="0"/>
-              <a:t>14/02/2014</a:t>
+              <a:t>16/02/2014</a:t>
             </a:fld>
             <a:endParaRPr lang="fr-BE"/>
           </a:p>
@@ -1503,7 +1503,7 @@
           <a:p>
             <a:fld id="{32634D8A-A9F9-4825-A4DC-9BEC228D81F1}" type="datetime1">
               <a:rPr lang="fr-FR" smtClean="0"/>
-              <a:t>14/02/2014</a:t>
+              <a:t>16/02/2014</a:t>
             </a:fld>
             <a:endParaRPr lang="fr-BE"/>
           </a:p>
@@ -1790,7 +1790,7 @@
           <a:p>
             <a:fld id="{C6F4CAAA-F27E-4521-B17A-E23914568578}" type="datetime1">
               <a:rPr lang="fr-FR" smtClean="0"/>
-              <a:t>14/02/2014</a:t>
+              <a:t>16/02/2014</a:t>
             </a:fld>
             <a:endParaRPr lang="fr-BE"/>
           </a:p>
@@ -2211,7 +2211,7 @@
           <a:p>
             <a:fld id="{7D5FA12D-4B2C-451E-B245-5BBAB23B1D8E}" type="datetime1">
               <a:rPr lang="fr-FR" smtClean="0"/>
-              <a:t>14/02/2014</a:t>
+              <a:t>16/02/2014</a:t>
             </a:fld>
             <a:endParaRPr lang="fr-BE"/>
           </a:p>
@@ -2328,7 +2328,7 @@
           <a:p>
             <a:fld id="{03C308EC-7FA5-48A1-AC31-27C0B68E5FC1}" type="datetime1">
               <a:rPr lang="fr-FR" smtClean="0"/>
-              <a:t>14/02/2014</a:t>
+              <a:t>16/02/2014</a:t>
             </a:fld>
             <a:endParaRPr lang="fr-BE"/>
           </a:p>
@@ -2422,7 +2422,7 @@
           <a:p>
             <a:fld id="{FA6D7DC9-B261-4760-859C-335352DA4003}" type="datetime1">
               <a:rPr lang="fr-FR" smtClean="0"/>
-              <a:t>14/02/2014</a:t>
+              <a:t>16/02/2014</a:t>
             </a:fld>
             <a:endParaRPr lang="fr-BE"/>
           </a:p>
@@ -2698,7 +2698,7 @@
           <a:p>
             <a:fld id="{E655F826-0647-479B-95C0-75DA0751992E}" type="datetime1">
               <a:rPr lang="fr-FR" smtClean="0"/>
-              <a:t>14/02/2014</a:t>
+              <a:t>16/02/2014</a:t>
             </a:fld>
             <a:endParaRPr lang="fr-BE"/>
           </a:p>
@@ -2950,7 +2950,7 @@
           <a:p>
             <a:fld id="{18F1E8EA-B5CD-4FB2-B3EB-3F67E8EEAEDA}" type="datetime1">
               <a:rPr lang="fr-FR" smtClean="0"/>
-              <a:t>14/02/2014</a:t>
+              <a:t>16/02/2014</a:t>
             </a:fld>
             <a:endParaRPr lang="fr-BE"/>
           </a:p>
@@ -3194,7 +3194,7 @@
           <a:p>
             <a:fld id="{88E02C3B-D3D9-43B7-9A8A-C03EC265FE24}" type="datetime1">
               <a:rPr lang="fr-FR" smtClean="0"/>
-              <a:t>14/02/2014</a:t>
+              <a:t>16/02/2014</a:t>
             </a:fld>
             <a:endParaRPr lang="fr-BE"/>
           </a:p>
@@ -3750,6 +3750,180 @@
           </a:p>
         </p:txBody>
       </p:sp>
+      <p:sp>
+        <p:nvSpPr>
+          <p:cNvPr id="7" name="Espace réservé du pied de page 8"/>
+          <p:cNvSpPr txBox="1">
+            <a:spLocks/>
+          </p:cNvSpPr>
+          <p:nvPr/>
+        </p:nvSpPr>
+        <p:spPr>
+          <a:xfrm>
+            <a:off x="2843808" y="5154555"/>
+            <a:ext cx="3456384" cy="1154765"/>
+          </a:xfrm>
+          <a:prstGeom prst="rect">
+            <a:avLst/>
+          </a:prstGeom>
+        </p:spPr>
+        <p:txBody>
+          <a:bodyPr vert="horz" lIns="91440" tIns="45720" rIns="91440" bIns="45720" rtlCol="0" anchor="ctr"/>
+          <a:lstStyle>
+            <a:defPPr>
+              <a:defRPr lang="fr-FR"/>
+            </a:defPPr>
+            <a:lvl1pPr marL="0" algn="ctr" defTabSz="914400" rtl="0" eaLnBrk="1" latinLnBrk="0" hangingPunct="1">
+              <a:defRPr sz="1200" kern="1200">
+                <a:solidFill>
+                  <a:schemeClr val="tx1">
+                    <a:tint val="75000"/>
+                  </a:schemeClr>
+                </a:solidFill>
+                <a:latin typeface="+mn-lt"/>
+                <a:ea typeface="+mn-ea"/>
+                <a:cs typeface="+mn-cs"/>
+              </a:defRPr>
+            </a:lvl1pPr>
+            <a:lvl2pPr marL="457200" algn="l" defTabSz="914400" rtl="0" eaLnBrk="1" latinLnBrk="0" hangingPunct="1">
+              <a:defRPr sz="1800" kern="1200">
+                <a:solidFill>
+                  <a:schemeClr val="tx1"/>
+                </a:solidFill>
+                <a:latin typeface="+mn-lt"/>
+                <a:ea typeface="+mn-ea"/>
+                <a:cs typeface="+mn-cs"/>
+              </a:defRPr>
+            </a:lvl2pPr>
+            <a:lvl3pPr marL="914400" algn="l" defTabSz="914400" rtl="0" eaLnBrk="1" latinLnBrk="0" hangingPunct="1">
+              <a:defRPr sz="1800" kern="1200">
+                <a:solidFill>
+                  <a:schemeClr val="tx1"/>
+                </a:solidFill>
+                <a:latin typeface="+mn-lt"/>
+                <a:ea typeface="+mn-ea"/>
+                <a:cs typeface="+mn-cs"/>
+              </a:defRPr>
+            </a:lvl3pPr>
+            <a:lvl4pPr marL="1371600" algn="l" defTabSz="914400" rtl="0" eaLnBrk="1" latinLnBrk="0" hangingPunct="1">
+              <a:defRPr sz="1800" kern="1200">
+                <a:solidFill>
+                  <a:schemeClr val="tx1"/>
+                </a:solidFill>
+                <a:latin typeface="+mn-lt"/>
+                <a:ea typeface="+mn-ea"/>
+                <a:cs typeface="+mn-cs"/>
+              </a:defRPr>
+            </a:lvl4pPr>
+            <a:lvl5pPr marL="1828800" algn="l" defTabSz="914400" rtl="0" eaLnBrk="1" latinLnBrk="0" hangingPunct="1">
+              <a:defRPr sz="1800" kern="1200">
+                <a:solidFill>
+                  <a:schemeClr val="tx1"/>
+                </a:solidFill>
+                <a:latin typeface="+mn-lt"/>
+                <a:ea typeface="+mn-ea"/>
+                <a:cs typeface="+mn-cs"/>
+              </a:defRPr>
+            </a:lvl5pPr>
+            <a:lvl6pPr marL="2286000" algn="l" defTabSz="914400" rtl="0" eaLnBrk="1" latinLnBrk="0" hangingPunct="1">
+              <a:defRPr sz="1800" kern="1200">
+                <a:solidFill>
+                  <a:schemeClr val="tx1"/>
+                </a:solidFill>
+                <a:latin typeface="+mn-lt"/>
+                <a:ea typeface="+mn-ea"/>
+                <a:cs typeface="+mn-cs"/>
+              </a:defRPr>
+            </a:lvl6pPr>
+            <a:lvl7pPr marL="2743200" algn="l" defTabSz="914400" rtl="0" eaLnBrk="1" latinLnBrk="0" hangingPunct="1">
+              <a:defRPr sz="1800" kern="1200">
+                <a:solidFill>
+                  <a:schemeClr val="tx1"/>
+                </a:solidFill>
+                <a:latin typeface="+mn-lt"/>
+                <a:ea typeface="+mn-ea"/>
+                <a:cs typeface="+mn-cs"/>
+              </a:defRPr>
+            </a:lvl7pPr>
+            <a:lvl8pPr marL="3200400" algn="l" defTabSz="914400" rtl="0" eaLnBrk="1" latinLnBrk="0" hangingPunct="1">
+              <a:defRPr sz="1800" kern="1200">
+                <a:solidFill>
+                  <a:schemeClr val="tx1"/>
+                </a:solidFill>
+                <a:latin typeface="+mn-lt"/>
+                <a:ea typeface="+mn-ea"/>
+                <a:cs typeface="+mn-cs"/>
+              </a:defRPr>
+            </a:lvl8pPr>
+            <a:lvl9pPr marL="3657600" algn="l" defTabSz="914400" rtl="0" eaLnBrk="1" latinLnBrk="0" hangingPunct="1">
+              <a:defRPr sz="1800" kern="1200">
+                <a:solidFill>
+                  <a:schemeClr val="tx1"/>
+                </a:solidFill>
+                <a:latin typeface="+mn-lt"/>
+                <a:ea typeface="+mn-ea"/>
+                <a:cs typeface="+mn-cs"/>
+              </a:defRPr>
+            </a:lvl9pPr>
+          </a:lstStyle>
+          <a:p>
+            <a:r>
+              <a:rPr lang="fr-FR" dirty="0" smtClean="0">
+                <a:solidFill>
+                  <a:schemeClr val="tx1"/>
+                </a:solidFill>
+              </a:rPr>
+              <a:t>Leonardo Alarcon</a:t>
+            </a:r>
+          </a:p>
+          <a:p>
+            <a:r>
+              <a:rPr lang="fr-FR" dirty="0" smtClean="0">
+                <a:solidFill>
+                  <a:schemeClr val="tx1"/>
+                </a:solidFill>
+              </a:rPr>
+              <a:t>Miguel Morales </a:t>
+            </a:r>
+            <a:r>
+              <a:rPr lang="fr-FR" dirty="0" err="1">
+                <a:solidFill>
+                  <a:schemeClr val="tx1"/>
+                </a:solidFill>
+              </a:rPr>
+              <a:t>M</a:t>
+            </a:r>
+            <a:r>
+              <a:rPr lang="fr-FR" dirty="0" err="1" smtClean="0">
+                <a:solidFill>
+                  <a:schemeClr val="tx1"/>
+                </a:solidFill>
+              </a:rPr>
+              <a:t>arkez</a:t>
+            </a:r>
+            <a:endParaRPr lang="fr-FR" dirty="0" smtClean="0">
+              <a:solidFill>
+                <a:schemeClr val="tx1"/>
+              </a:solidFill>
+            </a:endParaRPr>
+          </a:p>
+          <a:p>
+            <a:r>
+              <a:rPr lang="fr-FR" dirty="0" smtClean="0">
+                <a:solidFill>
+                  <a:schemeClr val="tx1"/>
+                </a:solidFill>
+              </a:rPr>
+              <a:t>Gildas Le Coq</a:t>
+            </a:r>
+            <a:endParaRPr lang="fr-BE" dirty="0">
+              <a:solidFill>
+                <a:schemeClr val="tx1"/>
+              </a:solidFill>
+            </a:endParaRPr>
+          </a:p>
+        </p:txBody>
+      </p:sp>
     </p:spTree>
     <p:extLst>
       <p:ext uri="{BB962C8B-B14F-4D97-AF65-F5344CB8AC3E}">
@@ -6045,15 +6219,7 @@
                   <a:schemeClr val="tx1"/>
                 </a:solidFill>
               </a:rPr>
-              <a:t>Chaque model à son </a:t>
-            </a:r>
-            <a:r>
-              <a:rPr lang="fr-FR" dirty="0" smtClean="0">
-                <a:solidFill>
-                  <a:schemeClr val="tx1"/>
-                </a:solidFill>
-              </a:rPr>
-              <a:t>service</a:t>
+              <a:t>Chaque model à son service</a:t>
             </a:r>
           </a:p>
           <a:p>
@@ -7354,31 +7520,7 @@
                   <a:schemeClr val="tx1"/>
                 </a:solidFill>
               </a:rPr>
-              <a:t>Les données </a:t>
-            </a:r>
-            <a:r>
-              <a:rPr lang="fr-FR" dirty="0" smtClean="0">
-                <a:solidFill>
-                  <a:schemeClr val="tx1"/>
-                </a:solidFill>
-              </a:rPr>
-              <a:t>sont affichées sur les pages web =&gt; </a:t>
-            </a:r>
-            <a:r>
-              <a:rPr lang="fr-FR" dirty="0" smtClean="0">
-                <a:solidFill>
-                  <a:schemeClr val="tx1"/>
-                </a:solidFill>
-              </a:rPr>
-              <a:t>La </a:t>
-            </a:r>
-            <a:r>
-              <a:rPr lang="fr-FR" dirty="0" smtClean="0">
-                <a:solidFill>
-                  <a:schemeClr val="tx1"/>
-                </a:solidFill>
-              </a:rPr>
-              <a:t>vue</a:t>
+              <a:t>Les données sont affichées sur les pages web =&gt; La vue</a:t>
             </a:r>
             <a:endParaRPr lang="fr-FR" dirty="0">
               <a:solidFill>
@@ -10890,8 +11032,8 @@
           <a:p>
             <a:pPr algn="ctr"/>
             <a:r>
-              <a:rPr lang="fr-FR" sz="1400" dirty="0" err="1" smtClean="0"/>
-              <a:t>Percesistance</a:t>
+              <a:rPr lang="fr-FR" sz="1400" dirty="0" smtClean="0"/>
+              <a:t>Persistance</a:t>
             </a:r>
             <a:endParaRPr lang="fr-FR" sz="1400" dirty="0" smtClean="0"/>
           </a:p>
@@ -11221,7 +11363,7 @@
           <p:nvPr>
             <p:extLst>
               <p:ext uri="{D42A27DB-BD31-4B8C-83A1-F6EECF244321}">
-                <p14:modId xmlns:p14="http://schemas.microsoft.com/office/powerpoint/2010/main" val="865558860"/>
+                <p14:modId xmlns:p14="http://schemas.microsoft.com/office/powerpoint/2010/main" val="2925615068"/>
               </p:ext>
             </p:extLst>
           </p:nvPr>
@@ -11296,7 +11438,15 @@
                     <a:p>
                       <a:r>
                         <a:rPr lang="fr-FR" dirty="0" smtClean="0"/>
-                        <a:t>Pour se connecter l’adhérent doit rentrer son login et mot de passe. C’est la seul façon d’accéder aux</a:t>
+                        <a:t>Pour se connecter l’adhérent doit rentrer son login et mot de passe. C’est la </a:t>
+                      </a:r>
+                      <a:r>
+                        <a:rPr lang="fr-FR" dirty="0" smtClean="0"/>
+                        <a:t>seule </a:t>
+                      </a:r>
+                      <a:r>
+                        <a:rPr lang="fr-FR" dirty="0" smtClean="0"/>
+                        <a:t>façon d’accéder aux</a:t>
                       </a:r>
                       <a:r>
                         <a:rPr lang="fr-FR" baseline="0" dirty="0" smtClean="0"/>
@@ -11330,11 +11480,23 @@
                     <a:p>
                       <a:r>
                         <a:rPr lang="fr-FR" dirty="0" smtClean="0"/>
-                        <a:t>Liste tout les articles contenues dans la base, avec leur nom,</a:t>
+                        <a:t>Liste tout les articles </a:t>
+                      </a:r>
+                      <a:r>
+                        <a:rPr lang="fr-FR" dirty="0" smtClean="0"/>
+                        <a:t>contenus </a:t>
+                      </a:r>
+                      <a:r>
+                        <a:rPr lang="fr-FR" dirty="0" smtClean="0"/>
+                        <a:t>dans la base, avec leur nom,</a:t>
                       </a:r>
                       <a:r>
                         <a:rPr lang="fr-FR" baseline="0" dirty="0" smtClean="0"/>
-                        <a:t> prix et le nombre disponible.</a:t>
+                        <a:t> prix et </a:t>
+                      </a:r>
+                      <a:r>
+                        <a:rPr lang="fr-FR" baseline="0" smtClean="0"/>
+                        <a:t>leurs stocks.</a:t>
                       </a:r>
                       <a:endParaRPr lang="fr-FR" dirty="0"/>
                     </a:p>

</xml_diff>